<commit_message>
first round of edits for Media AI. Second round to follow.
</commit_message>
<xml_diff>
--- a/WDS/Whiteboard design session trainer presentation - Media AI.pptx
+++ b/WDS/Whiteboard design session trainer presentation - Media AI.pptx
@@ -138,12 +138,45 @@
     <p:ext uri="{EFAFB233-063F-42B5-8137-9DF3F51BA10A}">
       <p15:sldGuideLst xmlns:p15="http://schemas.microsoft.com/office/powerpoint/2012/main"/>
     </p:ext>
+    <p:ext uri="{2D200454-40CA-4A62-9FC3-DE9A4176ACB9}">
+      <p15:notesGuideLst xmlns:p15="http://schemas.microsoft.com/office/powerpoint/2012/main"/>
+    </p:ext>
   </p:extLst>
 </p:presentation>
 </file>
 
-<file path=ppt/revisionInfo.xml><?xml version="1.0" encoding="utf-8"?>
-<p1510:revInfo xmlns:a="http://schemas.openxmlformats.org/drawingml/2006/main" xmlns:r="http://schemas.openxmlformats.org/officeDocument/2006/relationships" xmlns:p1510="http://schemas.microsoft.com/office/powerpoint/2015/10/main"/>
+<file path=ppt/commentAuthors.xml><?xml version="1.0" encoding="utf-8"?>
+<p:cmAuthorLst xmlns:a="http://schemas.openxmlformats.org/drawingml/2006/main" xmlns:r="http://schemas.openxmlformats.org/officeDocument/2006/relationships" xmlns:p="http://schemas.openxmlformats.org/presentationml/2006/main">
+  <p:cmAuthor id="2" name="Author" initials="A" lastIdx="2" clrIdx="1"/>
+</p:cmAuthorLst>
+</file>
+
+<file path=ppt/comments/comment1.xml><?xml version="1.0" encoding="utf-8"?>
+<p:cmLst xmlns:a="http://schemas.openxmlformats.org/drawingml/2006/main" xmlns:r="http://schemas.openxmlformats.org/officeDocument/2006/relationships" xmlns:p="http://schemas.openxmlformats.org/presentationml/2006/main">
+  <p:cm authorId="2" dt="2018-06-13T12:51:07.436" idx="1">
+    <p:pos x="4786" y="238"/>
+    <p:text>Ask Dawnmarie where Abstract lives</p:text>
+    <p:extLst>
+      <p:ext uri="{C676402C-5697-4E1C-873F-D02D1690AC5C}">
+        <p15:threadingInfo xmlns:p15="http://schemas.microsoft.com/office/powerpoint/2012/main" timeZoneBias="420"/>
+      </p:ext>
+    </p:extLst>
+  </p:cm>
+</p:cmLst>
+</file>
+
+<file path=ppt/comments/comment2.xml><?xml version="1.0" encoding="utf-8"?>
+<p:cmLst xmlns:a="http://schemas.openxmlformats.org/drawingml/2006/main" xmlns:r="http://schemas.openxmlformats.org/officeDocument/2006/relationships" xmlns:p="http://schemas.openxmlformats.org/presentationml/2006/main">
+  <p:cm authorId="2" dt="2018-06-13T12:58:45.224" idx="2">
+    <p:pos x="3387" y="254"/>
+    <p:text>Common scenarios needs some text. Check against WDS to see if its clarified there.</p:text>
+    <p:extLst>
+      <p:ext uri="{C676402C-5697-4E1C-873F-D02D1690AC5C}">
+        <p15:threadingInfo xmlns:p15="http://schemas.microsoft.com/office/powerpoint/2012/main" timeZoneBias="420"/>
+      </p:ext>
+    </p:extLst>
+  </p:cm>
+</p:cmLst>
 </file>
 
 <file path=ppt/notesMasters/notesMaster1.xml><?xml version="1.0" encoding="utf-8"?>
@@ -228,7 +261,7 @@
           <a:p>
             <a:fld id="{52A13B17-C506-4D51-BB37-16B365906619}" type="datetimeFigureOut">
               <a:rPr lang="en-US" smtClean="0"/>
-              <a:t>3/21/2018</a:t>
+              <a:t>6/13/2018</a:t>
             </a:fld>
             <a:endParaRPr lang="en-US" dirty="0"/>
           </a:p>
@@ -2295,7 +2328,7 @@
                   <a:prstClr val="black"/>
                 </a:solidFill>
               </a:rPr>
-              <a:t>3/21/2018 12:35 PM</a:t>
+              <a:t>6/13/2018 12:41 PM</a:t>
             </a:fld>
             <a:endParaRPr lang="en-US" dirty="0">
               <a:solidFill>
@@ -15271,10 +15304,15 @@
             <p:ph type="title"/>
           </p:nvPr>
         </p:nvSpPr>
-        <p:spPr/>
+        <p:spPr>
+          <a:xfrm>
+            <a:off x="268080" y="311283"/>
+            <a:ext cx="11655840" cy="1550174"/>
+          </a:xfrm>
+        </p:spPr>
         <p:txBody>
           <a:bodyPr>
-            <a:normAutofit fontScale="90000"/>
+            <a:normAutofit/>
           </a:bodyPr>
           <a:lstStyle/>
           <a:p>
@@ -15296,20 +15334,13 @@
               </a:rPr>
             </a:br>
             <a:r>
-              <a:rPr lang="en-US" dirty="0">
+              <a:rPr lang="en-US" sz="3600" dirty="0">
                 <a:solidFill>
                   <a:schemeClr val="tx1"/>
                 </a:solidFill>
-                <a:latin typeface="Segoe UI" panose="020B0502040204020203" pitchFamily="34" charset="0"/>
               </a:rPr>
               <a:t>Video-on-demand digital media</a:t>
             </a:r>
-            <a:endParaRPr lang="en-US" sz="3236" dirty="0">
-              <a:solidFill>
-                <a:schemeClr val="tx1"/>
-              </a:solidFill>
-              <a:latin typeface="Segoe UI" panose="020B0502040204020203" pitchFamily="34" charset="0"/>
-            </a:endParaRPr>
           </a:p>
         </p:txBody>
       </p:sp>
@@ -15391,7 +15422,12 @@
             <p:ph type="title"/>
           </p:nvPr>
         </p:nvSpPr>
-        <p:spPr/>
+        <p:spPr>
+          <a:xfrm>
+            <a:off x="269240" y="289511"/>
+            <a:ext cx="11655840" cy="1354232"/>
+          </a:xfrm>
+        </p:spPr>
         <p:txBody>
           <a:bodyPr>
             <a:normAutofit fontScale="90000"/>
@@ -15405,7 +15441,7 @@
                 </a:solidFill>
                 <a:cs typeface="Segoe UI" panose="020B0502040204020203" pitchFamily="34" charset="0"/>
               </a:rPr>
-              <a:t>Common scenarios</a:t>
+              <a:t>Common scenarios:</a:t>
             </a:r>
             <a:br>
               <a:rPr lang="en-US" dirty="0">
@@ -15416,20 +15452,13 @@
               </a:rPr>
             </a:br>
             <a:r>
-              <a:rPr lang="en-US" dirty="0">
+              <a:rPr lang="en-US" sz="4000" dirty="0">
                 <a:solidFill>
                   <a:schemeClr val="tx1"/>
                 </a:solidFill>
-                <a:latin typeface="Segoe UI" panose="020B0502040204020203" pitchFamily="34" charset="0"/>
               </a:rPr>
-              <a:t>Keyword search/speech-to-text/OCR digital media</a:t>
-            </a:r>
-            <a:endParaRPr lang="en-US" sz="3236" dirty="0">
-              <a:solidFill>
-                <a:schemeClr val="tx1"/>
-              </a:solidFill>
-              <a:latin typeface="Segoe UI" panose="020B0502040204020203" pitchFamily="34" charset="0"/>
-            </a:endParaRPr>
+              <a:t>Keyword search, speech-to-text, and OCR digital media</a:t>
+            </a:r>
           </a:p>
         </p:txBody>
       </p:sp>
@@ -15657,7 +15686,7 @@
           <p:nvPr>
             <p:extLst>
               <p:ext uri="{D42A27DB-BD31-4B8C-83A1-F6EECF244321}">
-                <p14:modId xmlns:p14="http://schemas.microsoft.com/office/powerpoint/2010/main" val="2031697640"/>
+                <p14:modId xmlns:p14="http://schemas.microsoft.com/office/powerpoint/2010/main" val="762253773"/>
               </p:ext>
             </p:extLst>
           </p:nvPr>
@@ -15719,7 +15748,7 @@
                           <a:latin typeface="Segoe UI" panose="020B0502040204020203" pitchFamily="34" charset="0"/>
                           <a:cs typeface="Segoe UI" panose="020B0502040204020203" pitchFamily="34" charset="0"/>
                         </a:rPr>
-                        <a:t>(10 minutes)</a:t>
+                        <a:t>(15 minutes)</a:t>
                       </a:r>
                       <a:br>
                         <a:rPr lang="en-US" sz="1300" b="0" i="0" dirty="0">
@@ -16659,7 +16688,7 @@
               </a:rPr>
               <a:t>Mary Bowman, Director of IT Operations</a:t>
             </a:r>
-            <a:endParaRPr lang="en-US" sz="2200" dirty="0">
+            <a:endParaRPr lang="en-US" sz="3600" dirty="0">
               <a:solidFill>
                 <a:schemeClr val="tx1"/>
               </a:solidFill>
@@ -16775,8 +16804,8 @@
         </p:nvSpPr>
         <p:spPr>
           <a:xfrm>
-            <a:off x="269239" y="1189176"/>
-            <a:ext cx="11653523" cy="4955065"/>
+            <a:off x="269238" y="1084722"/>
+            <a:ext cx="11653523" cy="5483767"/>
           </a:xfrm>
         </p:spPr>
         <p:txBody>
@@ -16804,7 +16833,14 @@
             </a:endParaRPr>
           </a:p>
           <a:p>
-            <a:pPr lvl="0" fontAlgn="base"/>
+            <a:pPr lvl="0" fontAlgn="base">
+              <a:lnSpc>
+                <a:spcPct val="100000"/>
+              </a:lnSpc>
+              <a:spcBef>
+                <a:spcPts val="0"/>
+              </a:spcBef>
+            </a:pPr>
             <a:r>
               <a:rPr lang="en-US" sz="2200" dirty="0">
                 <a:latin typeface="+mn-lt"/>
@@ -16814,56 +16850,111 @@
           </a:p>
           <a:p>
             <a:pPr marL="336145" lvl="1" indent="0" fontAlgn="base">
+              <a:lnSpc>
+                <a:spcPct val="100000"/>
+              </a:lnSpc>
+              <a:spcBef>
+                <a:spcPts val="0"/>
+              </a:spcBef>
               <a:buNone/>
             </a:pPr>
             <a:endParaRPr lang="en-US" sz="2200" dirty="0"/>
           </a:p>
           <a:p>
-            <a:pPr lvl="0" fontAlgn="base"/>
+            <a:pPr lvl="0" fontAlgn="base">
+              <a:lnSpc>
+                <a:spcPct val="100000"/>
+              </a:lnSpc>
+              <a:spcBef>
+                <a:spcPts val="0"/>
+              </a:spcBef>
+            </a:pPr>
             <a:r>
               <a:rPr lang="en-US" sz="2200" dirty="0">
                 <a:latin typeface="+mn-lt"/>
               </a:rPr>
-              <a:t>“Public” / End-user website through which customers of Contoso can watch video courses, including access to Video Insights such as transcriptions, captions, and search features</a:t>
-            </a:r>
-          </a:p>
-          <a:p>
-            <a:pPr lvl="1" fontAlgn="base"/>
+              <a:t>“Public” or end-user website through which customers of Contoso can watch video courses, including access to Video Insights such as transcriptions, captions, and search features</a:t>
+            </a:r>
+          </a:p>
+          <a:p>
+            <a:pPr lvl="1" fontAlgn="base">
+              <a:lnSpc>
+                <a:spcPct val="100000"/>
+              </a:lnSpc>
+              <a:spcBef>
+                <a:spcPts val="0"/>
+              </a:spcBef>
+            </a:pPr>
             <a:endParaRPr lang="en-US" sz="2200" dirty="0"/>
           </a:p>
           <a:p>
-            <a:pPr lvl="0" fontAlgn="base"/>
+            <a:pPr lvl="0" fontAlgn="base">
+              <a:lnSpc>
+                <a:spcPct val="100000"/>
+              </a:lnSpc>
+              <a:spcBef>
+                <a:spcPts val="0"/>
+              </a:spcBef>
+            </a:pPr>
             <a:r>
               <a:rPr lang="en-US" sz="2200" dirty="0">
                 <a:latin typeface="+mn-lt"/>
               </a:rPr>
-              <a:t>Background processing that is implemented with a serverless architecture using Azure Logic Apps and Azure Functions. This background processing orchestrates the video upload / encoding workflow.</a:t>
-            </a:r>
-          </a:p>
-          <a:p>
-            <a:pPr lvl="1" fontAlgn="base"/>
+              <a:t>Background processing that is implemented with a serverless architecture using Azure Logic Apps and Azure Functions. This background processing orchestrates the video upload or encoding workflow.</a:t>
+            </a:r>
+          </a:p>
+          <a:p>
+            <a:pPr lvl="1" fontAlgn="base">
+              <a:lnSpc>
+                <a:spcPct val="100000"/>
+              </a:lnSpc>
+              <a:spcBef>
+                <a:spcPts val="0"/>
+              </a:spcBef>
+            </a:pPr>
             <a:endParaRPr lang="en-US" sz="2200" dirty="0"/>
           </a:p>
           <a:p>
-            <a:pPr lvl="0" fontAlgn="base"/>
+            <a:pPr lvl="0" fontAlgn="base">
+              <a:lnSpc>
+                <a:spcPct val="100000"/>
+              </a:lnSpc>
+              <a:spcBef>
+                <a:spcPts val="0"/>
+              </a:spcBef>
+            </a:pPr>
             <a:r>
               <a:rPr lang="en-US" sz="2200" dirty="0">
                 <a:latin typeface="+mn-lt"/>
               </a:rPr>
-              <a:t>Azure Video Indexer service / API provides Video Encoding and Indexing capabilities, as well as video streaming to the “Public” / End-user website</a:t>
-            </a:r>
-          </a:p>
-          <a:p>
-            <a:pPr lvl="1" fontAlgn="base"/>
+              <a:t>Azure Video Indexer service or API provides video encoding and indexing capabilities, as well as video streaming to the “public” or end-user website</a:t>
+            </a:r>
+          </a:p>
+          <a:p>
+            <a:pPr lvl="1" fontAlgn="base">
+              <a:lnSpc>
+                <a:spcPct val="100000"/>
+              </a:lnSpc>
+              <a:spcBef>
+                <a:spcPts val="0"/>
+              </a:spcBef>
+            </a:pPr>
             <a:endParaRPr lang="en-US" sz="2200" dirty="0"/>
           </a:p>
           <a:p>
-            <a:pPr lvl="0" fontAlgn="base"/>
+            <a:pPr lvl="0" fontAlgn="base">
+              <a:lnSpc>
+                <a:spcPct val="100000"/>
+              </a:lnSpc>
+              <a:spcBef>
+                <a:spcPts val="0"/>
+              </a:spcBef>
+            </a:pPr>
             <a:r>
               <a:rPr lang="en-US" sz="2200" dirty="0">
                 <a:latin typeface="+mn-lt"/>
               </a:rPr>
-              <a:t>Backend database is used to store application data. It is recommended to use Azure Cosmos DB for higher scalability, but Azure SQL Database could also be implemented</a:t>
+              <a:t>Backend database is used to store application data. It is recommended to use Azure Cosmos DB for higher scalability, but Azure SQL Database could also be implemented.</a:t>
             </a:r>
           </a:p>
         </p:txBody>
@@ -17097,7 +17188,7 @@
                   <a:schemeClr val="tx1"/>
                 </a:solidFill>
               </a:rPr>
-              <a:t>Admin and “Public” / End-user website</a:t>
+              <a:t>Admin and “public” or end-user website</a:t>
             </a:r>
           </a:p>
           <a:p>
@@ -17307,7 +17398,7 @@
             </a:pPr>
             <a:r>
               <a:rPr lang="en-US" sz="2400" dirty="0"/>
-              <a:t>In this workshop, students will learn how to build, setup, and configure a Web Application that performs media streaming using Azure Services; including the Video Indexer API. Students will also learn how to implement video processing using Logic Apps, Azure Functions, and Video Indexer API to encode and transcribe videos.</a:t>
+              <a:t>In this workshop, students will learn how to build, setup, and configure a web application that performs media streaming using Azure Services; including the Video Indexer API. Students will also learn how to implement video processing using Logic Apps, Azure Functions, and Video Indexer API to encode and transcribe videos.</a:t>
             </a:r>
           </a:p>
           <a:p>
@@ -17513,7 +17604,7 @@
         </p:spPr>
         <p:txBody>
           <a:bodyPr>
-            <a:normAutofit lnSpcReduction="10000"/>
+            <a:normAutofit fontScale="92500" lnSpcReduction="10000"/>
           </a:bodyPr>
           <a:lstStyle/>
           <a:p>
@@ -17526,7 +17617,7 @@
                   <a:schemeClr val="tx1"/>
                 </a:solidFill>
               </a:rPr>
-              <a:t>Video Encoding and Transcription</a:t>
+              <a:t>Video encoding and transcription</a:t>
             </a:r>
           </a:p>
           <a:p>
@@ -17566,7 +17657,7 @@
                   <a:schemeClr val="tx1"/>
                 </a:solidFill>
               </a:rPr>
-              <a:t>Provides Video Encoding</a:t>
+              <a:t>Provides video encoding</a:t>
             </a:r>
           </a:p>
           <a:p>
@@ -17585,7 +17676,7 @@
                   <a:schemeClr val="tx1"/>
                 </a:solidFill>
               </a:rPr>
-              <a:t>Provides Video Transcription (Audio and OCR)</a:t>
+              <a:t>Provides Video Transcription (audio and OCR)</a:t>
             </a:r>
             <a:r>
               <a:rPr lang="en-US" sz="2408" dirty="0">
@@ -17593,10 +17684,21 @@
                   <a:schemeClr val="tx1"/>
                 </a:solidFill>
               </a:rPr>
-              <a:t> – including automatic translation into many different languages (</a:t>
-            </a:r>
-            <a:r>
-              <a:rPr lang="en-US" sz="2408" i="1" dirty="0">
+              <a:t> </a:t>
+            </a:r>
+          </a:p>
+          <a:p>
+            <a:pPr lvl="2"/>
+            <a:r>
+              <a:rPr lang="en-US" sz="2016" dirty="0">
+                <a:solidFill>
+                  <a:schemeClr val="tx1"/>
+                </a:solidFill>
+              </a:rPr>
+              <a:t>Includes automatic translation into many different languages (</a:t>
+            </a:r>
+            <a:r>
+              <a:rPr lang="en-US" sz="2016" i="1" dirty="0">
                 <a:solidFill>
                   <a:schemeClr val="tx1"/>
                 </a:solidFill>
@@ -17604,14 +17706,14 @@
               <a:t>English, Chinese, German, etc.</a:t>
             </a:r>
             <a:r>
-              <a:rPr lang="en-US" sz="2408" dirty="0">
+              <a:rPr lang="en-US" sz="2016" dirty="0">
                 <a:solidFill>
                   <a:schemeClr val="tx1"/>
                 </a:solidFill>
               </a:rPr>
               <a:t>)</a:t>
             </a:r>
-            <a:endParaRPr lang="en-US" sz="2800" dirty="0">
+            <a:endParaRPr lang="en-US" sz="2408" dirty="0">
               <a:solidFill>
                 <a:schemeClr val="tx1"/>
               </a:solidFill>
@@ -17723,11 +17825,14 @@
           <a:lstStyle/>
           <a:p>
             <a:r>
-              <a:rPr lang="en-US" sz="3600" dirty="0">
+              <a:rPr lang="en-US" sz="3600" spc="-100" dirty="0">
+                <a:ln w="3175">
+                  <a:noFill/>
+                </a:ln>
                 <a:solidFill>
                   <a:schemeClr val="tx1"/>
                 </a:solidFill>
-                <a:latin typeface="+mn-lt"/>
+                <a:cs typeface="Segoe UI" panose="020B0502040204020203" pitchFamily="34" charset="0"/>
               </a:rPr>
               <a:t>Background Processing</a:t>
             </a:r>
@@ -17756,14 +17861,6 @@
           </a:p>
           <a:p>
             <a:pPr lvl="1"/>
-            <a:endParaRPr lang="en-US" sz="2800" dirty="0">
-              <a:solidFill>
-                <a:schemeClr val="tx1"/>
-              </a:solidFill>
-            </a:endParaRPr>
-          </a:p>
-          <a:p>
-            <a:pPr lvl="1"/>
             <a:r>
               <a:rPr lang="en-US" sz="2800" dirty="0">
                 <a:solidFill>
@@ -17775,21 +17872,13 @@
           </a:p>
           <a:p>
             <a:pPr lvl="1"/>
-            <a:endParaRPr lang="en-US" sz="2800" dirty="0">
-              <a:solidFill>
-                <a:schemeClr val="tx1"/>
-              </a:solidFill>
-            </a:endParaRPr>
-          </a:p>
-          <a:p>
-            <a:pPr lvl="1"/>
             <a:r>
               <a:rPr lang="en-US" sz="2800" dirty="0">
                 <a:solidFill>
                   <a:schemeClr val="tx1"/>
                 </a:solidFill>
               </a:rPr>
-              <a:t>Azure Function integrated with Logic App to update Video processing status in back-end database</a:t>
+              <a:t>Azure Function integrated with Logic App to update video processing status in back-end database</a:t>
             </a:r>
           </a:p>
         </p:txBody>
@@ -17911,10 +18000,9 @@
               <a:rPr lang="en-US" sz="3200" dirty="0"/>
             </a:br>
             <a:r>
-              <a:rPr lang="en-US" sz="3200" b="1" dirty="0"/>
+              <a:rPr lang="en-US" sz="3200" dirty="0"/>
               <a:t>Potential Answer:</a:t>
             </a:r>
-            <a:endParaRPr lang="en-US" sz="3200" dirty="0"/>
           </a:p>
           <a:p>
             <a:pPr marL="0" indent="0">
@@ -18049,10 +18137,9 @@
               <a:rPr lang="en-US" sz="3200" dirty="0"/>
             </a:br>
             <a:r>
-              <a:rPr lang="en-US" sz="3200" b="1" dirty="0"/>
+              <a:rPr lang="en-US" sz="3200" dirty="0"/>
               <a:t>Potential Answer:</a:t>
             </a:r>
-            <a:endParaRPr lang="en-US" sz="3200" dirty="0"/>
           </a:p>
           <a:p>
             <a:pPr marL="0" indent="0">
@@ -18202,7 +18289,7 @@
               <a:rPr lang="en-US" dirty="0"/>
             </a:br>
             <a:r>
-              <a:rPr lang="en-US" b="1" dirty="0"/>
+              <a:rPr lang="en-US" dirty="0"/>
               <a:t>Potential Answer:</a:t>
             </a:r>
           </a:p>
@@ -18212,7 +18299,7 @@
             </a:pPr>
             <a:r>
               <a:rPr lang="en-US" dirty="0"/>
-              <a:t>The traditional path would be to hire translators to accurately translate content to different languages. The Video Indexer service, in addition to its Transcription and other cognitive capabilities, can translate the transcriptions into many different supported languages without any effort on your part.</a:t>
+              <a:t>The traditional path would be to hire translators to accurately translate content to different languages. The Video Indexer service, in addition to its transcription and other cognitive capabilities, can translate the transcriptions into many different supported languages without any effort on your part.</a:t>
             </a:r>
             <a:endParaRPr lang="en-US" sz="1800" dirty="0">
               <a:solidFill>
@@ -18341,10 +18428,9 @@
               <a:rPr lang="en-US" dirty="0"/>
             </a:br>
             <a:r>
-              <a:rPr lang="en-US" b="1" dirty="0"/>
+              <a:rPr lang="en-US" dirty="0"/>
               <a:t>Potential Answer:</a:t>
             </a:r>
-            <a:endParaRPr lang="en-US" dirty="0"/>
           </a:p>
           <a:p>
             <a:pPr marL="0" indent="0">
@@ -18838,7 +18924,7 @@
         <p:spPr>
           <a:xfrm>
             <a:off x="372896" y="1579380"/>
-            <a:ext cx="11181121" cy="3544221"/>
+            <a:ext cx="11181121" cy="4538616"/>
           </a:xfrm>
         </p:spPr>
         <p:txBody>
@@ -18854,7 +18940,7 @@
               <a:rPr lang="en-US" sz="2800" dirty="0">
                 <a:latin typeface="+mn-lt"/>
               </a:rPr>
-              <a:t>Contoso Consulting is a mature consulting firm that has been in the IT Consulting business for over 30 years with clients all over the world. They have a history of mainly specializing in Microsoft technologies, but do have an established practice of offering Linux and OSS based consulting. The company has adapted to the ever-changing landscape of IT for a long time, and has been involved in the training and adoption / transition process of many of its clients over the years. In addition to IT Consulting services, Contoso provides on-site and video-based training to their larger clients. This involves creating custom training content and course agendas based on the client’s needs and project being delivered.</a:t>
+              <a:t>Contoso Consulting is a mature consulting firm that has been in the IT consulting business for over 30 years with clients all over the world. They have a history of mainly specializing in Microsoft technologies, but do have an established practice of offering Linux and OSS based consulting. The company has adapted to the ever-changing landscape of IT for a long time, and has been involved in the training and adoption or transition process of many of its clients over the years. In addition to IT Consulting services, Contoso provides on-site and video-based training to their larger clients. This involves creating custom training content and course agendas based on the client’s needs and project being delivered.</a:t>
             </a:r>
           </a:p>
         </p:txBody>
@@ -19082,7 +19168,7 @@
               <a:rPr lang="en-US" sz="2800" dirty="0">
                 <a:latin typeface="+mn-lt"/>
               </a:rPr>
-              <a:t>Due to the efforts of their sales teams, Contoso has created many video-based training classes they have been able to deliver to clients using DVD’s or MP4 files. While this enables them to reuse training content and deliver it in a more affordable and scalable manner, it just does not give them the full capabilities they would like. As the content ages, the DVD’s or MP4’s are no longer relevant, and clients are solely purchasing individual courses. They have also used some of the available video hosting services on the market with only limited success. Everything they have tried so far has not quite offered the features and capabilities that an Enterprise needs for a good quality video streaming experience.</a:t>
+              <a:t>Due to the efforts of their sales teams, Contoso has created many video-based training classes they have been able to deliver to clients using DVDs or MP4 files. While this enables them to reuse training content and deliver it in a more affordable and scalable manner, it just does not give them the full capabilities they would like. As the content ages, the DVDs or MP4s are no longer relevant, and clients are solely purchasing individual courses. They have also used some of the available video hosting services on the market with only limited success. Everything they have tried so far has not quite offered the features and capabilities that an Enterprise needs for a good quality video streaming experience.</a:t>
             </a:r>
           </a:p>
         </p:txBody>
@@ -19198,7 +19284,7 @@
               <a:rPr lang="en-US" sz="2800" dirty="0">
                 <a:latin typeface="+mn-lt"/>
               </a:rPr>
-              <a:t>Because of this changing landscape of getting further into the IT Training business, the CEO of Contoso Consulting, Jill Sampson, has decided to pursue the development of Contoso’s own online, on-demand, video training service. Jill says, “I want to build the Netflix of IT Training!”. This new service will allow Contoso to easily resell subscriptions to their clients for all their video training courses. This will include general courses that any client can be sold, to one-off custom courses built for specific clients based on their own specific IT Infrastructure or Custom Software that Contoso has delivered to them.</a:t>
+              <a:t>Because of this changing landscape of getting further into the IT Training business, the CEO of Contoso Consulting, Jill Sampson, has decided to pursue the development of Contoso’s own online, on-demand, video training service. Jill says, “I want to build the Netflix of IT training!” This new service will allow Contoso to easily resell subscriptions to their clients for all their video training courses. This will include general courses that any client can be sold, to one-off custom courses built for specific clients based on their own specific IT infrastructure or custom software that Contoso has delivered to them.</a:t>
             </a:r>
           </a:p>
         </p:txBody>
@@ -19425,7 +19511,7 @@
               <a:rPr lang="en-US" sz="2400" dirty="0">
                 <a:latin typeface="+mn-lt"/>
               </a:rPr>
-              <a:t>The system must scale globally for their many clients all over the world, including new clients as Contoso grows their IT Training business</a:t>
+              <a:t>The system must scale globally for their many clients all over the world, including new clients as Contoso grows their IT training business</a:t>
             </a:r>
           </a:p>
           <a:p>
@@ -19443,7 +19529,7 @@
               <a:rPr lang="en-US" sz="2400" dirty="0">
                 <a:latin typeface="+mn-lt"/>
               </a:rPr>
-              <a:t>Copy protection or DRM are desired to keep their IP from getting stolen.</a:t>
+              <a:t>Copy protection or DRM are desired to keep their IP from getting stolen</a:t>
             </a:r>
           </a:p>
           <a:p>
@@ -19461,7 +19547,7 @@
               <a:rPr lang="en-US" sz="2400" dirty="0">
                 <a:latin typeface="+mn-lt"/>
               </a:rPr>
-              <a:t>The system needs to have an Administration Portal where new and updated content can be maintained by their internal staff</a:t>
+              <a:t>The system needs to have an administration portal where new and updated content can be maintained by their internal staff</a:t>
             </a:r>
           </a:p>
           <a:p>

</xml_diff>

<commit_message>
Made changes discussed with Dawnmarie 6/18
</commit_message>
<xml_diff>
--- a/WDS/Whiteboard design session trainer presentation - Media AI.pptx
+++ b/WDS/Whiteboard design session trainer presentation - Media AI.pptx
@@ -151,34 +151,6 @@
 </p:cmAuthorLst>
 </file>
 
-<file path=ppt/comments/comment1.xml><?xml version="1.0" encoding="utf-8"?>
-<p:cmLst xmlns:a="http://schemas.openxmlformats.org/drawingml/2006/main" xmlns:r="http://schemas.openxmlformats.org/officeDocument/2006/relationships" xmlns:p="http://schemas.openxmlformats.org/presentationml/2006/main">
-  <p:cm authorId="2" dt="2018-06-13T12:51:07.436" idx="1">
-    <p:pos x="4786" y="238"/>
-    <p:text>Ask Dawnmarie where Abstract lives</p:text>
-    <p:extLst>
-      <p:ext uri="{C676402C-5697-4E1C-873F-D02D1690AC5C}">
-        <p15:threadingInfo xmlns:p15="http://schemas.microsoft.com/office/powerpoint/2012/main" timeZoneBias="420"/>
-      </p:ext>
-    </p:extLst>
-  </p:cm>
-</p:cmLst>
-</file>
-
-<file path=ppt/comments/comment2.xml><?xml version="1.0" encoding="utf-8"?>
-<p:cmLst xmlns:a="http://schemas.openxmlformats.org/drawingml/2006/main" xmlns:r="http://schemas.openxmlformats.org/officeDocument/2006/relationships" xmlns:p="http://schemas.openxmlformats.org/presentationml/2006/main">
-  <p:cm authorId="2" dt="2018-06-13T12:58:45.224" idx="2">
-    <p:pos x="3387" y="254"/>
-    <p:text>Common scenarios needs some text. Check against WDS to see if its clarified there.</p:text>
-    <p:extLst>
-      <p:ext uri="{C676402C-5697-4E1C-873F-D02D1690AC5C}">
-        <p15:threadingInfo xmlns:p15="http://schemas.microsoft.com/office/powerpoint/2012/main" timeZoneBias="420"/>
-      </p:ext>
-    </p:extLst>
-  </p:cm>
-</p:cmLst>
-</file>
-
 <file path=ppt/notesMasters/notesMaster1.xml><?xml version="1.0" encoding="utf-8"?>
 <p:notesMaster xmlns:a="http://schemas.openxmlformats.org/drawingml/2006/main" xmlns:r="http://schemas.openxmlformats.org/officeDocument/2006/relationships" xmlns:p="http://schemas.openxmlformats.org/presentationml/2006/main">
   <p:cSld>
@@ -261,7 +233,7 @@
           <a:p>
             <a:fld id="{52A13B17-C506-4D51-BB37-16B365906619}" type="datetimeFigureOut">
               <a:rPr lang="en-US" smtClean="0"/>
-              <a:t>6/13/2018</a:t>
+              <a:t>6/18/2018</a:t>
             </a:fld>
             <a:endParaRPr lang="en-US" dirty="0"/>
           </a:p>
@@ -2328,7 +2300,7 @@
                   <a:prstClr val="black"/>
                 </a:solidFill>
               </a:rPr>
-              <a:t>6/13/2018 12:41 PM</a:t>
+              <a:t>6/18/2018 12:57 PM</a:t>
             </a:fld>
             <a:endParaRPr lang="en-US" dirty="0">
               <a:solidFill>

</xml_diff>